<commit_message>
Finished PowerPoint for our project.
</commit_message>
<xml_diff>
--- a/documents/SoftwareBookList_Sprint_1_Presentation.pptx
+++ b/documents/SoftwareBookList_Sprint_1_Presentation.pptx
@@ -4,9 +4,17 @@
   <p:sldMasterIdLst>
     <p:sldMasterId id="2147483660" r:id="rId1"/>
   </p:sldMasterIdLst>
+  <p:notesMasterIdLst>
+    <p:notesMasterId r:id="rId9"/>
+  </p:notesMasterIdLst>
   <p:sldIdLst>
     <p:sldId id="256" r:id="rId2"/>
     <p:sldId id="257" r:id="rId3"/>
+    <p:sldId id="258" r:id="rId4"/>
+    <p:sldId id="259" r:id="rId5"/>
+    <p:sldId id="260" r:id="rId6"/>
+    <p:sldId id="261" r:id="rId7"/>
+    <p:sldId id="262" r:id="rId8"/>
   </p:sldIdLst>
   <p:sldSz cx="12192000" cy="6858000"/>
   <p:notesSz cx="6858000" cy="9144000"/>
@@ -105,6 +113,11 @@
       </a:defRPr>
     </a:lvl9pPr>
   </p:defaultTextStyle>
+  <p:extLst>
+    <p:ext uri="{EFAFB233-063F-42B5-8137-9DF3F51BA10A}">
+      <p15:sldGuideLst xmlns:p15="http://schemas.microsoft.com/office/powerpoint/2012/main"/>
+    </p:ext>
+  </p:extLst>
 </p:presentation>
 </file>
 
@@ -865,101 +878,6 @@
           </pc:sldLayoutMkLst>
         </pc:sldLayoutChg>
       </pc:sldMasterChg>
-      <pc:sldMasterChg chg="add replId addSldLayout">
-        <pc:chgData name="Bohan, Shaun M" userId="acaa2405-47ab-4b93-95cc-c6ce05832430" providerId="ADAL" clId="{7223BEA0-BAD0-439F-BB20-4CC7D200F273}" dt="2023-09-18T18:54:09.413" v="67" actId="26606"/>
-        <pc:sldMasterMkLst>
-          <pc:docMk/>
-          <pc:sldMasterMk cId="1823241203" sldId="2147483660"/>
-        </pc:sldMasterMkLst>
-        <pc:sldLayoutChg chg="add">
-          <pc:chgData name="Bohan, Shaun M" userId="acaa2405-47ab-4b93-95cc-c6ce05832430" providerId="ADAL" clId="{7223BEA0-BAD0-439F-BB20-4CC7D200F273}" dt="2023-09-18T18:54:09.413" v="67" actId="26606"/>
-          <pc:sldLayoutMkLst>
-            <pc:docMk/>
-            <pc:sldMasterMk cId="1823241203" sldId="2147483660"/>
-            <pc:sldLayoutMk cId="3107100851" sldId="2147483661"/>
-          </pc:sldLayoutMkLst>
-        </pc:sldLayoutChg>
-        <pc:sldLayoutChg chg="add replId">
-          <pc:chgData name="Bohan, Shaun M" userId="acaa2405-47ab-4b93-95cc-c6ce05832430" providerId="ADAL" clId="{7223BEA0-BAD0-439F-BB20-4CC7D200F273}" dt="2023-09-18T18:54:09.413" v="67" actId="26606"/>
-          <pc:sldLayoutMkLst>
-            <pc:docMk/>
-            <pc:sldMasterMk cId="1823241203" sldId="2147483660"/>
-            <pc:sldLayoutMk cId="3217801958" sldId="2147483662"/>
-          </pc:sldLayoutMkLst>
-        </pc:sldLayoutChg>
-        <pc:sldLayoutChg chg="add replId">
-          <pc:chgData name="Bohan, Shaun M" userId="acaa2405-47ab-4b93-95cc-c6ce05832430" providerId="ADAL" clId="{7223BEA0-BAD0-439F-BB20-4CC7D200F273}" dt="2023-09-18T18:54:09.413" v="67" actId="26606"/>
-          <pc:sldLayoutMkLst>
-            <pc:docMk/>
-            <pc:sldMasterMk cId="1823241203" sldId="2147483660"/>
-            <pc:sldLayoutMk cId="3374636015" sldId="2147483663"/>
-          </pc:sldLayoutMkLst>
-        </pc:sldLayoutChg>
-        <pc:sldLayoutChg chg="add replId">
-          <pc:chgData name="Bohan, Shaun M" userId="acaa2405-47ab-4b93-95cc-c6ce05832430" providerId="ADAL" clId="{7223BEA0-BAD0-439F-BB20-4CC7D200F273}" dt="2023-09-18T18:54:09.413" v="67" actId="26606"/>
-          <pc:sldLayoutMkLst>
-            <pc:docMk/>
-            <pc:sldMasterMk cId="1823241203" sldId="2147483660"/>
-            <pc:sldLayoutMk cId="4094162530" sldId="2147483664"/>
-          </pc:sldLayoutMkLst>
-        </pc:sldLayoutChg>
-        <pc:sldLayoutChg chg="add replId">
-          <pc:chgData name="Bohan, Shaun M" userId="acaa2405-47ab-4b93-95cc-c6ce05832430" providerId="ADAL" clId="{7223BEA0-BAD0-439F-BB20-4CC7D200F273}" dt="2023-09-18T18:54:09.413" v="67" actId="26606"/>
-          <pc:sldLayoutMkLst>
-            <pc:docMk/>
-            <pc:sldMasterMk cId="1823241203" sldId="2147483660"/>
-            <pc:sldLayoutMk cId="1251054517" sldId="2147483665"/>
-          </pc:sldLayoutMkLst>
-        </pc:sldLayoutChg>
-        <pc:sldLayoutChg chg="add replId">
-          <pc:chgData name="Bohan, Shaun M" userId="acaa2405-47ab-4b93-95cc-c6ce05832430" providerId="ADAL" clId="{7223BEA0-BAD0-439F-BB20-4CC7D200F273}" dt="2023-09-18T18:54:09.413" v="67" actId="26606"/>
-          <pc:sldLayoutMkLst>
-            <pc:docMk/>
-            <pc:sldMasterMk cId="1823241203" sldId="2147483660"/>
-            <pc:sldLayoutMk cId="126065329" sldId="2147483666"/>
-          </pc:sldLayoutMkLst>
-        </pc:sldLayoutChg>
-        <pc:sldLayoutChg chg="add replId">
-          <pc:chgData name="Bohan, Shaun M" userId="acaa2405-47ab-4b93-95cc-c6ce05832430" providerId="ADAL" clId="{7223BEA0-BAD0-439F-BB20-4CC7D200F273}" dt="2023-09-18T18:54:09.413" v="67" actId="26606"/>
-          <pc:sldLayoutMkLst>
-            <pc:docMk/>
-            <pc:sldMasterMk cId="1823241203" sldId="2147483660"/>
-            <pc:sldLayoutMk cId="1267195015" sldId="2147483667"/>
-          </pc:sldLayoutMkLst>
-        </pc:sldLayoutChg>
-        <pc:sldLayoutChg chg="add replId">
-          <pc:chgData name="Bohan, Shaun M" userId="acaa2405-47ab-4b93-95cc-c6ce05832430" providerId="ADAL" clId="{7223BEA0-BAD0-439F-BB20-4CC7D200F273}" dt="2023-09-18T18:54:09.413" v="67" actId="26606"/>
-          <pc:sldLayoutMkLst>
-            <pc:docMk/>
-            <pc:sldMasterMk cId="1823241203" sldId="2147483660"/>
-            <pc:sldLayoutMk cId="132934275" sldId="2147483668"/>
-          </pc:sldLayoutMkLst>
-        </pc:sldLayoutChg>
-        <pc:sldLayoutChg chg="add replId">
-          <pc:chgData name="Bohan, Shaun M" userId="acaa2405-47ab-4b93-95cc-c6ce05832430" providerId="ADAL" clId="{7223BEA0-BAD0-439F-BB20-4CC7D200F273}" dt="2023-09-18T18:54:09.413" v="67" actId="26606"/>
-          <pc:sldLayoutMkLst>
-            <pc:docMk/>
-            <pc:sldMasterMk cId="1823241203" sldId="2147483660"/>
-            <pc:sldLayoutMk cId="3135922144" sldId="2147483669"/>
-          </pc:sldLayoutMkLst>
-        </pc:sldLayoutChg>
-        <pc:sldLayoutChg chg="add replId">
-          <pc:chgData name="Bohan, Shaun M" userId="acaa2405-47ab-4b93-95cc-c6ce05832430" providerId="ADAL" clId="{7223BEA0-BAD0-439F-BB20-4CC7D200F273}" dt="2023-09-18T18:54:09.413" v="67" actId="26606"/>
-          <pc:sldLayoutMkLst>
-            <pc:docMk/>
-            <pc:sldMasterMk cId="1823241203" sldId="2147483660"/>
-            <pc:sldLayoutMk cId="3512251504" sldId="2147483670"/>
-          </pc:sldLayoutMkLst>
-        </pc:sldLayoutChg>
-        <pc:sldLayoutChg chg="add replId">
-          <pc:chgData name="Bohan, Shaun M" userId="acaa2405-47ab-4b93-95cc-c6ce05832430" providerId="ADAL" clId="{7223BEA0-BAD0-439F-BB20-4CC7D200F273}" dt="2023-09-18T18:54:09.413" v="67" actId="26606"/>
-          <pc:sldLayoutMkLst>
-            <pc:docMk/>
-            <pc:sldMasterMk cId="1823241203" sldId="2147483660"/>
-            <pc:sldLayoutMk cId="1906008091" sldId="2147483671"/>
-          </pc:sldLayoutMkLst>
-        </pc:sldLayoutChg>
-      </pc:sldMasterChg>
       <pc:sldMasterChg chg="add del replId addSldLayout delSldLayout">
         <pc:chgData name="Bohan, Shaun M" userId="acaa2405-47ab-4b93-95cc-c6ce05832430" providerId="ADAL" clId="{7223BEA0-BAD0-439F-BB20-4CC7D200F273}" dt="2023-09-18T18:53:58.902" v="58" actId="26606"/>
         <pc:sldMasterMkLst>
@@ -1438,6 +1356,886 @@
     </pc:docChg>
   </pc:docChgLst>
 </pc:chgInfo>
+</file>
+
+<file path=ppt/notesMasters/notesMaster1.xml><?xml version="1.0" encoding="utf-8"?>
+<p:notesMaster xmlns:a="http://schemas.openxmlformats.org/drawingml/2006/main" xmlns:r="http://schemas.openxmlformats.org/officeDocument/2006/relationships" xmlns:p="http://schemas.openxmlformats.org/presentationml/2006/main">
+  <p:cSld>
+    <p:bg>
+      <p:bgRef idx="1001">
+        <a:schemeClr val="bg1"/>
+      </p:bgRef>
+    </p:bg>
+    <p:spTree>
+      <p:nvGrpSpPr>
+        <p:cNvPr id="1" name=""/>
+        <p:cNvGrpSpPr/>
+        <p:nvPr/>
+      </p:nvGrpSpPr>
+      <p:grpSpPr>
+        <a:xfrm>
+          <a:off x="0" y="0"/>
+          <a:ext cx="0" cy="0"/>
+          <a:chOff x="0" y="0"/>
+          <a:chExt cx="0" cy="0"/>
+        </a:xfrm>
+      </p:grpSpPr>
+      <p:sp>
+        <p:nvSpPr>
+          <p:cNvPr id="2" name="Header Placeholder 1"/>
+          <p:cNvSpPr>
+            <a:spLocks noGrp="1"/>
+          </p:cNvSpPr>
+          <p:nvPr>
+            <p:ph type="hdr" sz="quarter"/>
+          </p:nvPr>
+        </p:nvSpPr>
+        <p:spPr>
+          <a:xfrm>
+            <a:off x="0" y="0"/>
+            <a:ext cx="2971800" cy="458788"/>
+          </a:xfrm>
+          <a:prstGeom prst="rect">
+            <a:avLst/>
+          </a:prstGeom>
+        </p:spPr>
+        <p:txBody>
+          <a:bodyPr vert="horz" lIns="91440" tIns="45720" rIns="91440" bIns="45720" rtlCol="0"/>
+          <a:lstStyle>
+            <a:lvl1pPr algn="l">
+              <a:defRPr sz="1200"/>
+            </a:lvl1pPr>
+          </a:lstStyle>
+          <a:p>
+            <a:endParaRPr lang="en-US"/>
+          </a:p>
+        </p:txBody>
+      </p:sp>
+      <p:sp>
+        <p:nvSpPr>
+          <p:cNvPr id="3" name="Date Placeholder 2"/>
+          <p:cNvSpPr>
+            <a:spLocks noGrp="1"/>
+          </p:cNvSpPr>
+          <p:nvPr>
+            <p:ph type="dt" idx="1"/>
+          </p:nvPr>
+        </p:nvSpPr>
+        <p:spPr>
+          <a:xfrm>
+            <a:off x="3884613" y="0"/>
+            <a:ext cx="2971800" cy="458788"/>
+          </a:xfrm>
+          <a:prstGeom prst="rect">
+            <a:avLst/>
+          </a:prstGeom>
+        </p:spPr>
+        <p:txBody>
+          <a:bodyPr vert="horz" lIns="91440" tIns="45720" rIns="91440" bIns="45720" rtlCol="0"/>
+          <a:lstStyle>
+            <a:lvl1pPr algn="r">
+              <a:defRPr sz="1200"/>
+            </a:lvl1pPr>
+          </a:lstStyle>
+          <a:p>
+            <a:fld id="{44A806CE-B489-4A4F-81A3-7D65C1AE009E}" type="datetimeFigureOut">
+              <a:rPr lang="en-US" smtClean="0"/>
+              <a:t>9/18/2023</a:t>
+            </a:fld>
+            <a:endParaRPr lang="en-US"/>
+          </a:p>
+        </p:txBody>
+      </p:sp>
+      <p:sp>
+        <p:nvSpPr>
+          <p:cNvPr id="4" name="Slide Image Placeholder 3"/>
+          <p:cNvSpPr>
+            <a:spLocks noGrp="1" noRot="1" noChangeAspect="1"/>
+          </p:cNvSpPr>
+          <p:nvPr>
+            <p:ph type="sldImg" idx="2"/>
+          </p:nvPr>
+        </p:nvSpPr>
+        <p:spPr>
+          <a:xfrm>
+            <a:off x="685800" y="1143000"/>
+            <a:ext cx="5486400" cy="3086100"/>
+          </a:xfrm>
+          <a:prstGeom prst="rect">
+            <a:avLst/>
+          </a:prstGeom>
+          <a:noFill/>
+          <a:ln w="12700">
+            <a:solidFill>
+              <a:prstClr val="black"/>
+            </a:solidFill>
+          </a:ln>
+        </p:spPr>
+        <p:txBody>
+          <a:bodyPr vert="horz" lIns="91440" tIns="45720" rIns="91440" bIns="45720" rtlCol="0" anchor="ctr"/>
+          <a:lstStyle/>
+          <a:p>
+            <a:endParaRPr lang="en-US"/>
+          </a:p>
+        </p:txBody>
+      </p:sp>
+      <p:sp>
+        <p:nvSpPr>
+          <p:cNvPr id="5" name="Notes Placeholder 4"/>
+          <p:cNvSpPr>
+            <a:spLocks noGrp="1"/>
+          </p:cNvSpPr>
+          <p:nvPr>
+            <p:ph type="body" sz="quarter" idx="3"/>
+          </p:nvPr>
+        </p:nvSpPr>
+        <p:spPr>
+          <a:xfrm>
+            <a:off x="685800" y="4400550"/>
+            <a:ext cx="5486400" cy="3600450"/>
+          </a:xfrm>
+          <a:prstGeom prst="rect">
+            <a:avLst/>
+          </a:prstGeom>
+        </p:spPr>
+        <p:txBody>
+          <a:bodyPr vert="horz" lIns="91440" tIns="45720" rIns="91440" bIns="45720" rtlCol="0"/>
+          <a:lstStyle/>
+          <a:p>
+            <a:pPr lvl="0"/>
+            <a:r>
+              <a:rPr lang="en-US"/>
+              <a:t>Click to edit Master text styles</a:t>
+            </a:r>
+          </a:p>
+          <a:p>
+            <a:pPr lvl="1"/>
+            <a:r>
+              <a:rPr lang="en-US"/>
+              <a:t>Second level</a:t>
+            </a:r>
+          </a:p>
+          <a:p>
+            <a:pPr lvl="2"/>
+            <a:r>
+              <a:rPr lang="en-US"/>
+              <a:t>Third level</a:t>
+            </a:r>
+          </a:p>
+          <a:p>
+            <a:pPr lvl="3"/>
+            <a:r>
+              <a:rPr lang="en-US"/>
+              <a:t>Fourth level</a:t>
+            </a:r>
+          </a:p>
+          <a:p>
+            <a:pPr lvl="4"/>
+            <a:r>
+              <a:rPr lang="en-US"/>
+              <a:t>Fifth level</a:t>
+            </a:r>
+          </a:p>
+        </p:txBody>
+      </p:sp>
+      <p:sp>
+        <p:nvSpPr>
+          <p:cNvPr id="6" name="Footer Placeholder 5"/>
+          <p:cNvSpPr>
+            <a:spLocks noGrp="1"/>
+          </p:cNvSpPr>
+          <p:nvPr>
+            <p:ph type="ftr" sz="quarter" idx="4"/>
+          </p:nvPr>
+        </p:nvSpPr>
+        <p:spPr>
+          <a:xfrm>
+            <a:off x="0" y="8685213"/>
+            <a:ext cx="2971800" cy="458787"/>
+          </a:xfrm>
+          <a:prstGeom prst="rect">
+            <a:avLst/>
+          </a:prstGeom>
+        </p:spPr>
+        <p:txBody>
+          <a:bodyPr vert="horz" lIns="91440" tIns="45720" rIns="91440" bIns="45720" rtlCol="0" anchor="b"/>
+          <a:lstStyle>
+            <a:lvl1pPr algn="l">
+              <a:defRPr sz="1200"/>
+            </a:lvl1pPr>
+          </a:lstStyle>
+          <a:p>
+            <a:endParaRPr lang="en-US"/>
+          </a:p>
+        </p:txBody>
+      </p:sp>
+      <p:sp>
+        <p:nvSpPr>
+          <p:cNvPr id="7" name="Slide Number Placeholder 6"/>
+          <p:cNvSpPr>
+            <a:spLocks noGrp="1"/>
+          </p:cNvSpPr>
+          <p:nvPr>
+            <p:ph type="sldNum" sz="quarter" idx="5"/>
+          </p:nvPr>
+        </p:nvSpPr>
+        <p:spPr>
+          <a:xfrm>
+            <a:off x="3884613" y="8685213"/>
+            <a:ext cx="2971800" cy="458787"/>
+          </a:xfrm>
+          <a:prstGeom prst="rect">
+            <a:avLst/>
+          </a:prstGeom>
+        </p:spPr>
+        <p:txBody>
+          <a:bodyPr vert="horz" lIns="91440" tIns="45720" rIns="91440" bIns="45720" rtlCol="0" anchor="b"/>
+          <a:lstStyle>
+            <a:lvl1pPr algn="r">
+              <a:defRPr sz="1200"/>
+            </a:lvl1pPr>
+          </a:lstStyle>
+          <a:p>
+            <a:fld id="{0D5659E2-14EF-45D6-8862-1CAFBA2C55AA}" type="slidenum">
+              <a:rPr lang="en-US" smtClean="0"/>
+              <a:t>‹#›</a:t>
+            </a:fld>
+            <a:endParaRPr lang="en-US"/>
+          </a:p>
+        </p:txBody>
+      </p:sp>
+    </p:spTree>
+    <p:extLst>
+      <p:ext uri="{BB962C8B-B14F-4D97-AF65-F5344CB8AC3E}">
+        <p14:creationId xmlns:p14="http://schemas.microsoft.com/office/powerpoint/2010/main" val="4183465252"/>
+      </p:ext>
+    </p:extLst>
+  </p:cSld>
+  <p:clrMap bg1="lt1" tx1="dk1" bg2="lt2" tx2="dk2" accent1="accent1" accent2="accent2" accent3="accent3" accent4="accent4" accent5="accent5" accent6="accent6" hlink="hlink" folHlink="folHlink"/>
+  <p:notesStyle>
+    <a:lvl1pPr marL="0" algn="l" defTabSz="914400" rtl="0" eaLnBrk="1" latinLnBrk="0" hangingPunct="1">
+      <a:defRPr sz="1200" kern="1200">
+        <a:solidFill>
+          <a:schemeClr val="tx1"/>
+        </a:solidFill>
+        <a:latin typeface="+mn-lt"/>
+        <a:ea typeface="+mn-ea"/>
+        <a:cs typeface="+mn-cs"/>
+      </a:defRPr>
+    </a:lvl1pPr>
+    <a:lvl2pPr marL="457200" algn="l" defTabSz="914400" rtl="0" eaLnBrk="1" latinLnBrk="0" hangingPunct="1">
+      <a:defRPr sz="1200" kern="1200">
+        <a:solidFill>
+          <a:schemeClr val="tx1"/>
+        </a:solidFill>
+        <a:latin typeface="+mn-lt"/>
+        <a:ea typeface="+mn-ea"/>
+        <a:cs typeface="+mn-cs"/>
+      </a:defRPr>
+    </a:lvl2pPr>
+    <a:lvl3pPr marL="914400" algn="l" defTabSz="914400" rtl="0" eaLnBrk="1" latinLnBrk="0" hangingPunct="1">
+      <a:defRPr sz="1200" kern="1200">
+        <a:solidFill>
+          <a:schemeClr val="tx1"/>
+        </a:solidFill>
+        <a:latin typeface="+mn-lt"/>
+        <a:ea typeface="+mn-ea"/>
+        <a:cs typeface="+mn-cs"/>
+      </a:defRPr>
+    </a:lvl3pPr>
+    <a:lvl4pPr marL="1371600" algn="l" defTabSz="914400" rtl="0" eaLnBrk="1" latinLnBrk="0" hangingPunct="1">
+      <a:defRPr sz="1200" kern="1200">
+        <a:solidFill>
+          <a:schemeClr val="tx1"/>
+        </a:solidFill>
+        <a:latin typeface="+mn-lt"/>
+        <a:ea typeface="+mn-ea"/>
+        <a:cs typeface="+mn-cs"/>
+      </a:defRPr>
+    </a:lvl4pPr>
+    <a:lvl5pPr marL="1828800" algn="l" defTabSz="914400" rtl="0" eaLnBrk="1" latinLnBrk="0" hangingPunct="1">
+      <a:defRPr sz="1200" kern="1200">
+        <a:solidFill>
+          <a:schemeClr val="tx1"/>
+        </a:solidFill>
+        <a:latin typeface="+mn-lt"/>
+        <a:ea typeface="+mn-ea"/>
+        <a:cs typeface="+mn-cs"/>
+      </a:defRPr>
+    </a:lvl5pPr>
+    <a:lvl6pPr marL="2286000" algn="l" defTabSz="914400" rtl="0" eaLnBrk="1" latinLnBrk="0" hangingPunct="1">
+      <a:defRPr sz="1200" kern="1200">
+        <a:solidFill>
+          <a:schemeClr val="tx1"/>
+        </a:solidFill>
+        <a:latin typeface="+mn-lt"/>
+        <a:ea typeface="+mn-ea"/>
+        <a:cs typeface="+mn-cs"/>
+      </a:defRPr>
+    </a:lvl6pPr>
+    <a:lvl7pPr marL="2743200" algn="l" defTabSz="914400" rtl="0" eaLnBrk="1" latinLnBrk="0" hangingPunct="1">
+      <a:defRPr sz="1200" kern="1200">
+        <a:solidFill>
+          <a:schemeClr val="tx1"/>
+        </a:solidFill>
+        <a:latin typeface="+mn-lt"/>
+        <a:ea typeface="+mn-ea"/>
+        <a:cs typeface="+mn-cs"/>
+      </a:defRPr>
+    </a:lvl7pPr>
+    <a:lvl8pPr marL="3200400" algn="l" defTabSz="914400" rtl="0" eaLnBrk="1" latinLnBrk="0" hangingPunct="1">
+      <a:defRPr sz="1200" kern="1200">
+        <a:solidFill>
+          <a:schemeClr val="tx1"/>
+        </a:solidFill>
+        <a:latin typeface="+mn-lt"/>
+        <a:ea typeface="+mn-ea"/>
+        <a:cs typeface="+mn-cs"/>
+      </a:defRPr>
+    </a:lvl8pPr>
+    <a:lvl9pPr marL="3657600" algn="l" defTabSz="914400" rtl="0" eaLnBrk="1" latinLnBrk="0" hangingPunct="1">
+      <a:defRPr sz="1200" kern="1200">
+        <a:solidFill>
+          <a:schemeClr val="tx1"/>
+        </a:solidFill>
+        <a:latin typeface="+mn-lt"/>
+        <a:ea typeface="+mn-ea"/>
+        <a:cs typeface="+mn-cs"/>
+      </a:defRPr>
+    </a:lvl9pPr>
+  </p:notesStyle>
+</p:notesMaster>
+</file>
+
+<file path=ppt/notesSlides/notesSlide1.xml><?xml version="1.0" encoding="utf-8"?>
+<p:notes xmlns:a="http://schemas.openxmlformats.org/drawingml/2006/main" xmlns:r="http://schemas.openxmlformats.org/officeDocument/2006/relationships" xmlns:p="http://schemas.openxmlformats.org/presentationml/2006/main">
+  <p:cSld>
+    <p:spTree>
+      <p:nvGrpSpPr>
+        <p:cNvPr id="1" name=""/>
+        <p:cNvGrpSpPr/>
+        <p:nvPr/>
+      </p:nvGrpSpPr>
+      <p:grpSpPr>
+        <a:xfrm>
+          <a:off x="0" y="0"/>
+          <a:ext cx="0" cy="0"/>
+          <a:chOff x="0" y="0"/>
+          <a:chExt cx="0" cy="0"/>
+        </a:xfrm>
+      </p:grpSpPr>
+      <p:sp>
+        <p:nvSpPr>
+          <p:cNvPr id="2" name="Slide Image Placeholder 1"/>
+          <p:cNvSpPr>
+            <a:spLocks noGrp="1" noRot="1" noChangeAspect="1"/>
+          </p:cNvSpPr>
+          <p:nvPr>
+            <p:ph type="sldImg"/>
+          </p:nvPr>
+        </p:nvSpPr>
+        <p:spPr/>
+      </p:sp>
+      <p:sp>
+        <p:nvSpPr>
+          <p:cNvPr id="3" name="Notes Placeholder 2"/>
+          <p:cNvSpPr>
+            <a:spLocks noGrp="1"/>
+          </p:cNvSpPr>
+          <p:nvPr>
+            <p:ph type="body" idx="1"/>
+          </p:nvPr>
+        </p:nvSpPr>
+        <p:spPr/>
+        <p:txBody>
+          <a:bodyPr/>
+          <a:lstStyle/>
+          <a:p>
+            <a:r>
+              <a:rPr lang="en-US" dirty="0"/>
+              <a:t>Google Book API influenced a lot of our tables</a:t>
+            </a:r>
+          </a:p>
+          <a:p>
+            <a:endParaRPr lang="en-US" dirty="0"/>
+          </a:p>
+          <a:p>
+            <a:r>
+              <a:rPr lang="en-US" dirty="0"/>
+              <a:t>Our plan for the </a:t>
+            </a:r>
+            <a:r>
+              <a:rPr lang="en-US" dirty="0" err="1"/>
+              <a:t>BookID</a:t>
+            </a:r>
+            <a:r>
+              <a:rPr lang="en-US" dirty="0"/>
+              <a:t> is the </a:t>
+            </a:r>
+            <a:r>
+              <a:rPr lang="en-US" dirty="0" err="1"/>
+              <a:t>BookID</a:t>
+            </a:r>
+            <a:r>
+              <a:rPr lang="en-US" dirty="0"/>
+              <a:t> that google gives us</a:t>
+            </a:r>
+          </a:p>
+          <a:p>
+            <a:endParaRPr lang="en-US" dirty="0"/>
+          </a:p>
+          <a:p>
+            <a:r>
+              <a:rPr lang="en-US" dirty="0" err="1"/>
+              <a:t>BookList_Status</a:t>
+            </a:r>
+            <a:r>
+              <a:rPr lang="en-US" dirty="0"/>
+              <a:t> acts like a list for the users to organize their own list of books into </a:t>
+            </a:r>
+            <a:r>
+              <a:rPr lang="en-US" dirty="0" err="1"/>
+              <a:t>sublists</a:t>
+            </a:r>
+            <a:r>
+              <a:rPr lang="en-US" dirty="0"/>
+              <a:t>, such as books “I’ve read”, “I Want to Read”, etc.</a:t>
+            </a:r>
+          </a:p>
+          <a:p>
+            <a:endParaRPr lang="en-US" dirty="0"/>
+          </a:p>
+          <a:p>
+            <a:r>
+              <a:rPr lang="en-US" dirty="0"/>
+              <a:t>There can be many messages in one discussion, both can be identified. A discussion can be checked for multiple messages inside. Messages = “Comments” within discussions</a:t>
+            </a:r>
+          </a:p>
+          <a:p>
+            <a:endParaRPr lang="en-US" dirty="0"/>
+          </a:p>
+          <a:p>
+            <a:r>
+              <a:rPr lang="en-US" dirty="0"/>
+              <a:t>We have 2 bridge tables, “</a:t>
+            </a:r>
+            <a:r>
+              <a:rPr lang="en-US" dirty="0" err="1"/>
+              <a:t>BookTag</a:t>
+            </a:r>
+            <a:r>
+              <a:rPr lang="en-US" dirty="0"/>
+              <a:t>:”, a bunch of keys within, and then we have </a:t>
+            </a:r>
+            <a:r>
+              <a:rPr lang="en-US" dirty="0" err="1"/>
+              <a:t>Book_List</a:t>
+            </a:r>
+            <a:r>
+              <a:rPr lang="en-US" dirty="0"/>
+              <a:t> as a bridge table. Keys create object </a:t>
+            </a:r>
+          </a:p>
+          <a:p>
+            <a:endParaRPr lang="en-US" dirty="0"/>
+          </a:p>
+          <a:p>
+            <a:r>
+              <a:rPr lang="en-US" dirty="0"/>
+              <a:t>Book Images are given through a string within an API call for thumbnail images.</a:t>
+            </a:r>
+          </a:p>
+          <a:p>
+            <a:endParaRPr lang="en-US" dirty="0"/>
+          </a:p>
+          <a:p>
+            <a:r>
+              <a:rPr lang="en-US" dirty="0"/>
+              <a:t>Rating score is based out of 10 and only whole numbers, Book ratings will be averaged and therefore made a decimal. </a:t>
+            </a:r>
+          </a:p>
+          <a:p>
+            <a:endParaRPr lang="en-US" dirty="0"/>
+          </a:p>
+          <a:p>
+            <a:r>
+              <a:rPr lang="en-US" dirty="0"/>
+              <a:t>User has one list, and has </a:t>
+            </a:r>
+            <a:r>
+              <a:rPr lang="en-US" dirty="0" err="1"/>
+              <a:t>sublists</a:t>
+            </a:r>
+            <a:r>
+              <a:rPr lang="en-US" dirty="0"/>
+              <a:t> inside of it.</a:t>
+            </a:r>
+          </a:p>
+        </p:txBody>
+      </p:sp>
+      <p:sp>
+        <p:nvSpPr>
+          <p:cNvPr id="4" name="Slide Number Placeholder 3"/>
+          <p:cNvSpPr>
+            <a:spLocks noGrp="1"/>
+          </p:cNvSpPr>
+          <p:nvPr>
+            <p:ph type="sldNum" sz="quarter" idx="5"/>
+          </p:nvPr>
+        </p:nvSpPr>
+        <p:spPr/>
+        <p:txBody>
+          <a:bodyPr/>
+          <a:lstStyle/>
+          <a:p>
+            <a:fld id="{0D5659E2-14EF-45D6-8862-1CAFBA2C55AA}" type="slidenum">
+              <a:rPr lang="en-US" smtClean="0"/>
+              <a:t>3</a:t>
+            </a:fld>
+            <a:endParaRPr lang="en-US"/>
+          </a:p>
+        </p:txBody>
+      </p:sp>
+    </p:spTree>
+    <p:extLst>
+      <p:ext uri="{BB962C8B-B14F-4D97-AF65-F5344CB8AC3E}">
+        <p14:creationId xmlns:p14="http://schemas.microsoft.com/office/powerpoint/2010/main" val="1095653170"/>
+      </p:ext>
+    </p:extLst>
+  </p:cSld>
+  <p:clrMapOvr>
+    <a:masterClrMapping/>
+  </p:clrMapOvr>
+</p:notes>
+</file>
+
+<file path=ppt/notesSlides/notesSlide2.xml><?xml version="1.0" encoding="utf-8"?>
+<p:notes xmlns:a="http://schemas.openxmlformats.org/drawingml/2006/main" xmlns:r="http://schemas.openxmlformats.org/officeDocument/2006/relationships" xmlns:p="http://schemas.openxmlformats.org/presentationml/2006/main">
+  <p:cSld>
+    <p:spTree>
+      <p:nvGrpSpPr>
+        <p:cNvPr id="1" name=""/>
+        <p:cNvGrpSpPr/>
+        <p:nvPr/>
+      </p:nvGrpSpPr>
+      <p:grpSpPr>
+        <a:xfrm>
+          <a:off x="0" y="0"/>
+          <a:ext cx="0" cy="0"/>
+          <a:chOff x="0" y="0"/>
+          <a:chExt cx="0" cy="0"/>
+        </a:xfrm>
+      </p:grpSpPr>
+      <p:sp>
+        <p:nvSpPr>
+          <p:cNvPr id="2" name="Slide Image Placeholder 1"/>
+          <p:cNvSpPr>
+            <a:spLocks noGrp="1" noRot="1" noChangeAspect="1"/>
+          </p:cNvSpPr>
+          <p:nvPr>
+            <p:ph type="sldImg"/>
+          </p:nvPr>
+        </p:nvSpPr>
+        <p:spPr/>
+      </p:sp>
+      <p:sp>
+        <p:nvSpPr>
+          <p:cNvPr id="3" name="Notes Placeholder 2"/>
+          <p:cNvSpPr>
+            <a:spLocks noGrp="1"/>
+          </p:cNvSpPr>
+          <p:nvPr>
+            <p:ph type="body" idx="1"/>
+          </p:nvPr>
+        </p:nvSpPr>
+        <p:spPr/>
+        <p:txBody>
+          <a:bodyPr/>
+          <a:lstStyle/>
+          <a:p>
+            <a:r>
+              <a:rPr lang="en-US" dirty="0"/>
+              <a:t>Home Page, Community, Books Page</a:t>
+            </a:r>
+          </a:p>
+          <a:p>
+            <a:endParaRPr lang="en-US" dirty="0"/>
+          </a:p>
+          <a:p>
+            <a:endParaRPr lang="en-US" dirty="0"/>
+          </a:p>
+          <a:p>
+            <a:r>
+              <a:rPr lang="en-US" dirty="0"/>
+              <a:t>Our community page is likely to have a forum, clubs, and blogs. </a:t>
+            </a:r>
+          </a:p>
+          <a:p>
+            <a:endParaRPr lang="en-US" dirty="0"/>
+          </a:p>
+          <a:p>
+            <a:r>
+              <a:rPr lang="en-US" dirty="0"/>
+              <a:t>The community page could have a specific page named “Discussions” </a:t>
+            </a:r>
+          </a:p>
+          <a:p>
+            <a:endParaRPr lang="en-US" i="1" dirty="0"/>
+          </a:p>
+          <a:p>
+            <a:r>
+              <a:rPr lang="en-US" i="1" dirty="0"/>
+              <a:t>To clean up the review vs. discussion page, we can have the discussion comments linked within a specific book as “Discussion” and take you to the community page within the discussion tabs. The discussion would be linked to a specific book and nested within a specific page. Everyone can review a book ONCE! You can thumbs up or thumbs down a review or discussion that could be a feature later on.</a:t>
+            </a:r>
+          </a:p>
+          <a:p>
+            <a:endParaRPr lang="en-US" dirty="0"/>
+          </a:p>
+          <a:p>
+            <a:endParaRPr lang="en-US" dirty="0"/>
+          </a:p>
+        </p:txBody>
+      </p:sp>
+      <p:sp>
+        <p:nvSpPr>
+          <p:cNvPr id="4" name="Slide Number Placeholder 3"/>
+          <p:cNvSpPr>
+            <a:spLocks noGrp="1"/>
+          </p:cNvSpPr>
+          <p:nvPr>
+            <p:ph type="sldNum" sz="quarter" idx="5"/>
+          </p:nvPr>
+        </p:nvSpPr>
+        <p:spPr/>
+        <p:txBody>
+          <a:bodyPr/>
+          <a:lstStyle/>
+          <a:p>
+            <a:fld id="{0D5659E2-14EF-45D6-8862-1CAFBA2C55AA}" type="slidenum">
+              <a:rPr lang="en-US" smtClean="0"/>
+              <a:t>4</a:t>
+            </a:fld>
+            <a:endParaRPr lang="en-US"/>
+          </a:p>
+        </p:txBody>
+      </p:sp>
+    </p:spTree>
+    <p:extLst>
+      <p:ext uri="{BB962C8B-B14F-4D97-AF65-F5344CB8AC3E}">
+        <p14:creationId xmlns:p14="http://schemas.microsoft.com/office/powerpoint/2010/main" val="4277982477"/>
+      </p:ext>
+    </p:extLst>
+  </p:cSld>
+  <p:clrMapOvr>
+    <a:masterClrMapping/>
+  </p:clrMapOvr>
+</p:notes>
+</file>
+
+<file path=ppt/notesSlides/notesSlide3.xml><?xml version="1.0" encoding="utf-8"?>
+<p:notes xmlns:a="http://schemas.openxmlformats.org/drawingml/2006/main" xmlns:r="http://schemas.openxmlformats.org/officeDocument/2006/relationships" xmlns:p="http://schemas.openxmlformats.org/presentationml/2006/main">
+  <p:cSld>
+    <p:spTree>
+      <p:nvGrpSpPr>
+        <p:cNvPr id="1" name=""/>
+        <p:cNvGrpSpPr/>
+        <p:nvPr/>
+      </p:nvGrpSpPr>
+      <p:grpSpPr>
+        <a:xfrm>
+          <a:off x="0" y="0"/>
+          <a:ext cx="0" cy="0"/>
+          <a:chOff x="0" y="0"/>
+          <a:chExt cx="0" cy="0"/>
+        </a:xfrm>
+      </p:grpSpPr>
+      <p:sp>
+        <p:nvSpPr>
+          <p:cNvPr id="2" name="Slide Image Placeholder 1"/>
+          <p:cNvSpPr>
+            <a:spLocks noGrp="1" noRot="1" noChangeAspect="1"/>
+          </p:cNvSpPr>
+          <p:nvPr>
+            <p:ph type="sldImg"/>
+          </p:nvPr>
+        </p:nvSpPr>
+        <p:spPr/>
+      </p:sp>
+      <p:sp>
+        <p:nvSpPr>
+          <p:cNvPr id="3" name="Notes Placeholder 2"/>
+          <p:cNvSpPr>
+            <a:spLocks noGrp="1"/>
+          </p:cNvSpPr>
+          <p:nvPr>
+            <p:ph type="body" idx="1"/>
+          </p:nvPr>
+        </p:nvSpPr>
+        <p:spPr/>
+        <p:txBody>
+          <a:bodyPr/>
+          <a:lstStyle/>
+          <a:p>
+            <a:r>
+              <a:rPr lang="en-US" dirty="0"/>
+              <a:t>Account, Book Details, Log in/Sign Up Page</a:t>
+            </a:r>
+          </a:p>
+          <a:p>
+            <a:endParaRPr lang="en-US" dirty="0"/>
+          </a:p>
+          <a:p>
+            <a:r>
+              <a:rPr lang="en-US" dirty="0"/>
+              <a:t>Within the Book Detail page, there will be more in-depth information about the book, that’s given to us through he API</a:t>
+            </a:r>
+          </a:p>
+          <a:p>
+            <a:endParaRPr lang="en-US" dirty="0"/>
+          </a:p>
+          <a:p>
+            <a:r>
+              <a:rPr lang="en-US" dirty="0"/>
+              <a:t>You can filter or sort reviews by newest, most upvoted, </a:t>
+            </a:r>
+            <a:r>
+              <a:rPr lang="en-US" dirty="0" err="1"/>
+              <a:t>etc</a:t>
+            </a:r>
+            <a:r>
+              <a:rPr lang="en-US" dirty="0"/>
+              <a:t> </a:t>
+            </a:r>
+          </a:p>
+          <a:p>
+            <a:endParaRPr lang="en-US" dirty="0"/>
+          </a:p>
+          <a:p>
+            <a:r>
+              <a:rPr lang="en-US" dirty="0"/>
+              <a:t>Long term within the project, we may want a where to buy option for individual books. This could be E-Book or physical book.</a:t>
+            </a:r>
+          </a:p>
+        </p:txBody>
+      </p:sp>
+      <p:sp>
+        <p:nvSpPr>
+          <p:cNvPr id="4" name="Slide Number Placeholder 3"/>
+          <p:cNvSpPr>
+            <a:spLocks noGrp="1"/>
+          </p:cNvSpPr>
+          <p:nvPr>
+            <p:ph type="sldNum" sz="quarter" idx="5"/>
+          </p:nvPr>
+        </p:nvSpPr>
+        <p:spPr/>
+        <p:txBody>
+          <a:bodyPr/>
+          <a:lstStyle/>
+          <a:p>
+            <a:fld id="{0D5659E2-14EF-45D6-8862-1CAFBA2C55AA}" type="slidenum">
+              <a:rPr lang="en-US" smtClean="0"/>
+              <a:t>5</a:t>
+            </a:fld>
+            <a:endParaRPr lang="en-US"/>
+          </a:p>
+        </p:txBody>
+      </p:sp>
+    </p:spTree>
+    <p:extLst>
+      <p:ext uri="{BB962C8B-B14F-4D97-AF65-F5344CB8AC3E}">
+        <p14:creationId xmlns:p14="http://schemas.microsoft.com/office/powerpoint/2010/main" val="351108562"/>
+      </p:ext>
+    </p:extLst>
+  </p:cSld>
+  <p:clrMapOvr>
+    <a:masterClrMapping/>
+  </p:clrMapOvr>
+</p:notes>
+</file>
+
+<file path=ppt/notesSlides/notesSlide4.xml><?xml version="1.0" encoding="utf-8"?>
+<p:notes xmlns:a="http://schemas.openxmlformats.org/drawingml/2006/main" xmlns:r="http://schemas.openxmlformats.org/officeDocument/2006/relationships" xmlns:p="http://schemas.openxmlformats.org/presentationml/2006/main">
+  <p:cSld>
+    <p:spTree>
+      <p:nvGrpSpPr>
+        <p:cNvPr id="1" name=""/>
+        <p:cNvGrpSpPr/>
+        <p:nvPr/>
+      </p:nvGrpSpPr>
+      <p:grpSpPr>
+        <a:xfrm>
+          <a:off x="0" y="0"/>
+          <a:ext cx="0" cy="0"/>
+          <a:chOff x="0" y="0"/>
+          <a:chExt cx="0" cy="0"/>
+        </a:xfrm>
+      </p:grpSpPr>
+      <p:sp>
+        <p:nvSpPr>
+          <p:cNvPr id="2" name="Slide Image Placeholder 1"/>
+          <p:cNvSpPr>
+            <a:spLocks noGrp="1" noRot="1" noChangeAspect="1"/>
+          </p:cNvSpPr>
+          <p:nvPr>
+            <p:ph type="sldImg"/>
+          </p:nvPr>
+        </p:nvSpPr>
+        <p:spPr/>
+      </p:sp>
+      <p:sp>
+        <p:nvSpPr>
+          <p:cNvPr id="3" name="Notes Placeholder 2"/>
+          <p:cNvSpPr>
+            <a:spLocks noGrp="1"/>
+          </p:cNvSpPr>
+          <p:nvPr>
+            <p:ph type="body" idx="1"/>
+          </p:nvPr>
+        </p:nvSpPr>
+        <p:spPr/>
+        <p:txBody>
+          <a:bodyPr/>
+          <a:lstStyle/>
+          <a:p>
+            <a:endParaRPr lang="en-US" dirty="0"/>
+          </a:p>
+        </p:txBody>
+      </p:sp>
+      <p:sp>
+        <p:nvSpPr>
+          <p:cNvPr id="4" name="Slide Number Placeholder 3"/>
+          <p:cNvSpPr>
+            <a:spLocks noGrp="1"/>
+          </p:cNvSpPr>
+          <p:nvPr>
+            <p:ph type="sldNum" sz="quarter" idx="5"/>
+          </p:nvPr>
+        </p:nvSpPr>
+        <p:spPr/>
+        <p:txBody>
+          <a:bodyPr/>
+          <a:lstStyle/>
+          <a:p>
+            <a:fld id="{0D5659E2-14EF-45D6-8862-1CAFBA2C55AA}" type="slidenum">
+              <a:rPr lang="en-US" smtClean="0"/>
+              <a:t>6</a:t>
+            </a:fld>
+            <a:endParaRPr lang="en-US"/>
+          </a:p>
+        </p:txBody>
+      </p:sp>
+    </p:spTree>
+    <p:extLst>
+      <p:ext uri="{BB962C8B-B14F-4D97-AF65-F5344CB8AC3E}">
+        <p14:creationId xmlns:p14="http://schemas.microsoft.com/office/powerpoint/2010/main" val="3886232309"/>
+      </p:ext>
+    </p:extLst>
+  </p:cSld>
+  <p:clrMapOvr>
+    <a:masterClrMapping/>
+  </p:clrMapOvr>
+</p:notes>
 </file>
 
 <file path=ppt/slideLayouts/slideLayout1.xml><?xml version="1.0" encoding="utf-8"?>
@@ -7150,7 +7948,7 @@
           <a:p>
             <a:r>
               <a:rPr lang="en-US" dirty="0"/>
-              <a:t>The project</a:t>
+              <a:t>The Project</a:t>
             </a:r>
           </a:p>
         </p:txBody>
@@ -7192,16 +7990,11 @@
                 <a:latin typeface="Calibri" panose="020F0502020204030204" pitchFamily="34" charset="0"/>
                 <a:cs typeface="Arial" panose="020B0604020202020204" pitchFamily="34" charset="0"/>
               </a:rPr>
-              <a:t>For this Sprint </a:t>
-            </a:r>
-            <a:r>
-              <a:rPr lang="en-US" sz="1800">
-                <a:latin typeface="Calibri" panose="020F0502020204030204" pitchFamily="34" charset="0"/>
-                <a:cs typeface="Arial" panose="020B0604020202020204" pitchFamily="34" charset="0"/>
-              </a:rPr>
-              <a:t>we covered</a:t>
-            </a:r>
-            <a:endParaRPr lang="en-US"/>
+              <a:t>For this Sprint we covered creating our ERD, wireframes, and project scope, setting up API calls for our project, and creating a baseline ASP.NET solution</a:t>
+            </a:r>
+          </a:p>
+          <a:p>
+            <a:endParaRPr lang="en-US" dirty="0"/>
           </a:p>
         </p:txBody>
       </p:sp>
@@ -7209,6 +8002,703 @@
     <p:extLst>
       <p:ext uri="{BB962C8B-B14F-4D97-AF65-F5344CB8AC3E}">
         <p14:creationId xmlns:p14="http://schemas.microsoft.com/office/powerpoint/2010/main" val="2789056624"/>
+      </p:ext>
+    </p:extLst>
+  </p:cSld>
+  <p:clrMapOvr>
+    <a:masterClrMapping/>
+  </p:clrMapOvr>
+</p:sld>
+</file>
+
+<file path=ppt/slides/slide3.xml><?xml version="1.0" encoding="utf-8"?>
+<p:sld xmlns:a="http://schemas.openxmlformats.org/drawingml/2006/main" xmlns:r="http://schemas.openxmlformats.org/officeDocument/2006/relationships" xmlns:p="http://schemas.openxmlformats.org/presentationml/2006/main">
+  <p:cSld>
+    <p:spTree>
+      <p:nvGrpSpPr>
+        <p:cNvPr id="1" name=""/>
+        <p:cNvGrpSpPr/>
+        <p:nvPr/>
+      </p:nvGrpSpPr>
+      <p:grpSpPr>
+        <a:xfrm>
+          <a:off x="0" y="0"/>
+          <a:ext cx="0" cy="0"/>
+          <a:chOff x="0" y="0"/>
+          <a:chExt cx="0" cy="0"/>
+        </a:xfrm>
+      </p:grpSpPr>
+      <p:sp>
+        <p:nvSpPr>
+          <p:cNvPr id="2" name="Title 1">
+            <a:extLst>
+              <a:ext uri="{FF2B5EF4-FFF2-40B4-BE49-F238E27FC236}">
+                <a16:creationId xmlns:a16="http://schemas.microsoft.com/office/drawing/2014/main" id="{4A69B81F-1B9B-4A16-B696-7F69CA686F9F}"/>
+              </a:ext>
+            </a:extLst>
+          </p:cNvPr>
+          <p:cNvSpPr>
+            <a:spLocks noGrp="1"/>
+          </p:cNvSpPr>
+          <p:nvPr>
+            <p:ph type="title"/>
+          </p:nvPr>
+        </p:nvSpPr>
+        <p:spPr/>
+        <p:txBody>
+          <a:bodyPr/>
+          <a:lstStyle/>
+          <a:p>
+            <a:r>
+              <a:rPr lang="en-US"/>
+              <a:t>ERD </a:t>
+            </a:r>
+            <a:endParaRPr lang="en-US" dirty="0"/>
+          </a:p>
+        </p:txBody>
+      </p:sp>
+      <p:pic>
+        <p:nvPicPr>
+          <p:cNvPr id="5" name="Content Placeholder 4" descr="A computer screen shot of a computer&#10;&#10;Description automatically generated">
+            <a:extLst>
+              <a:ext uri="{FF2B5EF4-FFF2-40B4-BE49-F238E27FC236}">
+                <a16:creationId xmlns:a16="http://schemas.microsoft.com/office/drawing/2014/main" id="{E80E099A-3852-9901-369F-94698B2BAECA}"/>
+              </a:ext>
+            </a:extLst>
+          </p:cNvPr>
+          <p:cNvPicPr>
+            <a:picLocks noGrp="1" noChangeAspect="1"/>
+          </p:cNvPicPr>
+          <p:nvPr>
+            <p:ph idx="1"/>
+          </p:nvPr>
+        </p:nvPicPr>
+        <p:blipFill>
+          <a:blip r:embed="rId3"/>
+          <a:stretch>
+            <a:fillRect/>
+          </a:stretch>
+        </p:blipFill>
+        <p:spPr>
+          <a:xfrm>
+            <a:off x="2524905" y="1550126"/>
+            <a:ext cx="7386782" cy="4379595"/>
+          </a:xfrm>
+        </p:spPr>
+      </p:pic>
+    </p:spTree>
+    <p:extLst>
+      <p:ext uri="{BB962C8B-B14F-4D97-AF65-F5344CB8AC3E}">
+        <p14:creationId xmlns:p14="http://schemas.microsoft.com/office/powerpoint/2010/main" val="3062897125"/>
+      </p:ext>
+    </p:extLst>
+  </p:cSld>
+  <p:clrMapOvr>
+    <a:masterClrMapping/>
+  </p:clrMapOvr>
+</p:sld>
+</file>
+
+<file path=ppt/slides/slide4.xml><?xml version="1.0" encoding="utf-8"?>
+<p:sld xmlns:a="http://schemas.openxmlformats.org/drawingml/2006/main" xmlns:r="http://schemas.openxmlformats.org/officeDocument/2006/relationships" xmlns:p="http://schemas.openxmlformats.org/presentationml/2006/main">
+  <p:cSld>
+    <p:spTree>
+      <p:nvGrpSpPr>
+        <p:cNvPr id="1" name=""/>
+        <p:cNvGrpSpPr/>
+        <p:nvPr/>
+      </p:nvGrpSpPr>
+      <p:grpSpPr>
+        <a:xfrm>
+          <a:off x="0" y="0"/>
+          <a:ext cx="0" cy="0"/>
+          <a:chOff x="0" y="0"/>
+          <a:chExt cx="0" cy="0"/>
+        </a:xfrm>
+      </p:grpSpPr>
+      <p:sp>
+        <p:nvSpPr>
+          <p:cNvPr id="2" name="Title 1">
+            <a:extLst>
+              <a:ext uri="{FF2B5EF4-FFF2-40B4-BE49-F238E27FC236}">
+                <a16:creationId xmlns:a16="http://schemas.microsoft.com/office/drawing/2014/main" id="{35D89A96-0D31-C419-88B4-F954B046ED07}"/>
+              </a:ext>
+            </a:extLst>
+          </p:cNvPr>
+          <p:cNvSpPr>
+            <a:spLocks noGrp="1"/>
+          </p:cNvSpPr>
+          <p:nvPr>
+            <p:ph type="title"/>
+          </p:nvPr>
+        </p:nvSpPr>
+        <p:spPr/>
+        <p:txBody>
+          <a:bodyPr/>
+          <a:lstStyle/>
+          <a:p>
+            <a:r>
+              <a:rPr lang="en-US" dirty="0"/>
+              <a:t>Wireframes </a:t>
+            </a:r>
+          </a:p>
+        </p:txBody>
+      </p:sp>
+      <p:pic>
+        <p:nvPicPr>
+          <p:cNvPr id="5" name="Picture 4">
+            <a:extLst>
+              <a:ext uri="{FF2B5EF4-FFF2-40B4-BE49-F238E27FC236}">
+                <a16:creationId xmlns:a16="http://schemas.microsoft.com/office/drawing/2014/main" id="{222F8DED-45B6-8E6F-1AA5-0F2E452444BA}"/>
+              </a:ext>
+            </a:extLst>
+          </p:cNvPr>
+          <p:cNvPicPr>
+            <a:picLocks noChangeAspect="1"/>
+          </p:cNvPicPr>
+          <p:nvPr/>
+        </p:nvPicPr>
+        <p:blipFill>
+          <a:blip r:embed="rId3"/>
+          <a:stretch>
+            <a:fillRect/>
+          </a:stretch>
+        </p:blipFill>
+        <p:spPr>
+          <a:xfrm>
+            <a:off x="1271055" y="1824345"/>
+            <a:ext cx="2748463" cy="3748852"/>
+          </a:xfrm>
+          <a:prstGeom prst="rect">
+            <a:avLst/>
+          </a:prstGeom>
+        </p:spPr>
+      </p:pic>
+      <p:pic>
+        <p:nvPicPr>
+          <p:cNvPr id="7" name="Picture 6">
+            <a:extLst>
+              <a:ext uri="{FF2B5EF4-FFF2-40B4-BE49-F238E27FC236}">
+                <a16:creationId xmlns:a16="http://schemas.microsoft.com/office/drawing/2014/main" id="{91D624E2-0428-DF11-16DD-084E6EAF5BDA}"/>
+              </a:ext>
+            </a:extLst>
+          </p:cNvPr>
+          <p:cNvPicPr>
+            <a:picLocks noChangeAspect="1"/>
+          </p:cNvPicPr>
+          <p:nvPr/>
+        </p:nvPicPr>
+        <p:blipFill>
+          <a:blip r:embed="rId4"/>
+          <a:stretch>
+            <a:fillRect/>
+          </a:stretch>
+        </p:blipFill>
+        <p:spPr>
+          <a:xfrm>
+            <a:off x="4725670" y="1798508"/>
+            <a:ext cx="3076650" cy="3748852"/>
+          </a:xfrm>
+          <a:prstGeom prst="rect">
+            <a:avLst/>
+          </a:prstGeom>
+        </p:spPr>
+      </p:pic>
+      <p:pic>
+        <p:nvPicPr>
+          <p:cNvPr id="9" name="Picture 8">
+            <a:extLst>
+              <a:ext uri="{FF2B5EF4-FFF2-40B4-BE49-F238E27FC236}">
+                <a16:creationId xmlns:a16="http://schemas.microsoft.com/office/drawing/2014/main" id="{4E7CF56F-E86B-0D7F-A9A0-F1CE9BA78A83}"/>
+              </a:ext>
+            </a:extLst>
+          </p:cNvPr>
+          <p:cNvPicPr>
+            <a:picLocks noChangeAspect="1"/>
+          </p:cNvPicPr>
+          <p:nvPr/>
+        </p:nvPicPr>
+        <p:blipFill>
+          <a:blip r:embed="rId5"/>
+          <a:stretch>
+            <a:fillRect/>
+          </a:stretch>
+        </p:blipFill>
+        <p:spPr>
+          <a:xfrm>
+            <a:off x="8759899" y="1798507"/>
+            <a:ext cx="2978036" cy="3748851"/>
+          </a:xfrm>
+          <a:prstGeom prst="rect">
+            <a:avLst/>
+          </a:prstGeom>
+        </p:spPr>
+      </p:pic>
+    </p:spTree>
+    <p:extLst>
+      <p:ext uri="{BB962C8B-B14F-4D97-AF65-F5344CB8AC3E}">
+        <p14:creationId xmlns:p14="http://schemas.microsoft.com/office/powerpoint/2010/main" val="3323767793"/>
+      </p:ext>
+    </p:extLst>
+  </p:cSld>
+  <p:clrMapOvr>
+    <a:masterClrMapping/>
+  </p:clrMapOvr>
+</p:sld>
+</file>
+
+<file path=ppt/slides/slide5.xml><?xml version="1.0" encoding="utf-8"?>
+<p:sld xmlns:a="http://schemas.openxmlformats.org/drawingml/2006/main" xmlns:r="http://schemas.openxmlformats.org/officeDocument/2006/relationships" xmlns:p="http://schemas.openxmlformats.org/presentationml/2006/main">
+  <p:cSld>
+    <p:spTree>
+      <p:nvGrpSpPr>
+        <p:cNvPr id="1" name=""/>
+        <p:cNvGrpSpPr/>
+        <p:nvPr/>
+      </p:nvGrpSpPr>
+      <p:grpSpPr>
+        <a:xfrm>
+          <a:off x="0" y="0"/>
+          <a:ext cx="0" cy="0"/>
+          <a:chOff x="0" y="0"/>
+          <a:chExt cx="0" cy="0"/>
+        </a:xfrm>
+      </p:grpSpPr>
+      <p:sp>
+        <p:nvSpPr>
+          <p:cNvPr id="2" name="Title 1">
+            <a:extLst>
+              <a:ext uri="{FF2B5EF4-FFF2-40B4-BE49-F238E27FC236}">
+                <a16:creationId xmlns:a16="http://schemas.microsoft.com/office/drawing/2014/main" id="{74E119DD-3EFF-FC39-AA04-83E0E59D13F1}"/>
+              </a:ext>
+            </a:extLst>
+          </p:cNvPr>
+          <p:cNvSpPr>
+            <a:spLocks noGrp="1"/>
+          </p:cNvSpPr>
+          <p:nvPr>
+            <p:ph type="title"/>
+          </p:nvPr>
+        </p:nvSpPr>
+        <p:spPr>
+          <a:xfrm>
+            <a:off x="1587710" y="455362"/>
+            <a:ext cx="9486690" cy="1196933"/>
+          </a:xfrm>
+        </p:spPr>
+        <p:txBody>
+          <a:bodyPr/>
+          <a:lstStyle/>
+          <a:p>
+            <a:r>
+              <a:rPr lang="en-US" dirty="0"/>
+              <a:t>Wireframes </a:t>
+            </a:r>
+          </a:p>
+        </p:txBody>
+      </p:sp>
+      <p:pic>
+        <p:nvPicPr>
+          <p:cNvPr id="4" name="Content Placeholder 3">
+            <a:extLst>
+              <a:ext uri="{FF2B5EF4-FFF2-40B4-BE49-F238E27FC236}">
+                <a16:creationId xmlns:a16="http://schemas.microsoft.com/office/drawing/2014/main" id="{A3F95728-090F-CDC0-8AC3-718AFF341874}"/>
+              </a:ext>
+            </a:extLst>
+          </p:cNvPr>
+          <p:cNvPicPr>
+            <a:picLocks noGrp="1" noChangeAspect="1"/>
+          </p:cNvPicPr>
+          <p:nvPr>
+            <p:ph idx="1"/>
+          </p:nvPr>
+        </p:nvPicPr>
+        <p:blipFill>
+          <a:blip r:embed="rId3"/>
+          <a:stretch>
+            <a:fillRect/>
+          </a:stretch>
+        </p:blipFill>
+        <p:spPr>
+          <a:xfrm>
+            <a:off x="1587710" y="1754717"/>
+            <a:ext cx="2975429" cy="4500244"/>
+          </a:xfrm>
+          <a:prstGeom prst="rect">
+            <a:avLst/>
+          </a:prstGeom>
+        </p:spPr>
+      </p:pic>
+      <p:pic>
+        <p:nvPicPr>
+          <p:cNvPr id="6" name="Picture 5">
+            <a:extLst>
+              <a:ext uri="{FF2B5EF4-FFF2-40B4-BE49-F238E27FC236}">
+                <a16:creationId xmlns:a16="http://schemas.microsoft.com/office/drawing/2014/main" id="{AEBC2141-D384-3B3E-AC50-3AC2982291C5}"/>
+              </a:ext>
+            </a:extLst>
+          </p:cNvPr>
+          <p:cNvPicPr>
+            <a:picLocks noChangeAspect="1"/>
+          </p:cNvPicPr>
+          <p:nvPr/>
+        </p:nvPicPr>
+        <p:blipFill>
+          <a:blip r:embed="rId4"/>
+          <a:stretch>
+            <a:fillRect/>
+          </a:stretch>
+        </p:blipFill>
+        <p:spPr>
+          <a:xfrm>
+            <a:off x="5093998" y="1754717"/>
+            <a:ext cx="3102624" cy="4500244"/>
+          </a:xfrm>
+          <a:prstGeom prst="rect">
+            <a:avLst/>
+          </a:prstGeom>
+        </p:spPr>
+      </p:pic>
+      <p:pic>
+        <p:nvPicPr>
+          <p:cNvPr id="7" name="Picture 6">
+            <a:extLst>
+              <a:ext uri="{FF2B5EF4-FFF2-40B4-BE49-F238E27FC236}">
+                <a16:creationId xmlns:a16="http://schemas.microsoft.com/office/drawing/2014/main" id="{6A52B74E-AA30-6EC1-3F1C-A6942E149F4B}"/>
+              </a:ext>
+            </a:extLst>
+          </p:cNvPr>
+          <p:cNvPicPr>
+            <a:picLocks noChangeAspect="1"/>
+          </p:cNvPicPr>
+          <p:nvPr/>
+        </p:nvPicPr>
+        <p:blipFill>
+          <a:blip r:embed="rId5"/>
+          <a:stretch>
+            <a:fillRect/>
+          </a:stretch>
+        </p:blipFill>
+        <p:spPr>
+          <a:xfrm>
+            <a:off x="8727482" y="1754718"/>
+            <a:ext cx="3102624" cy="4500244"/>
+          </a:xfrm>
+          <a:prstGeom prst="rect">
+            <a:avLst/>
+          </a:prstGeom>
+        </p:spPr>
+      </p:pic>
+    </p:spTree>
+    <p:extLst>
+      <p:ext uri="{BB962C8B-B14F-4D97-AF65-F5344CB8AC3E}">
+        <p14:creationId xmlns:p14="http://schemas.microsoft.com/office/powerpoint/2010/main" val="116995561"/>
+      </p:ext>
+    </p:extLst>
+  </p:cSld>
+  <p:clrMapOvr>
+    <a:masterClrMapping/>
+  </p:clrMapOvr>
+</p:sld>
+</file>
+
+<file path=ppt/slides/slide6.xml><?xml version="1.0" encoding="utf-8"?>
+<p:sld xmlns:a="http://schemas.openxmlformats.org/drawingml/2006/main" xmlns:r="http://schemas.openxmlformats.org/officeDocument/2006/relationships" xmlns:p="http://schemas.openxmlformats.org/presentationml/2006/main">
+  <p:cSld>
+    <p:spTree>
+      <p:nvGrpSpPr>
+        <p:cNvPr id="1" name=""/>
+        <p:cNvGrpSpPr/>
+        <p:nvPr/>
+      </p:nvGrpSpPr>
+      <p:grpSpPr>
+        <a:xfrm>
+          <a:off x="0" y="0"/>
+          <a:ext cx="0" cy="0"/>
+          <a:chOff x="0" y="0"/>
+          <a:chExt cx="0" cy="0"/>
+        </a:xfrm>
+      </p:grpSpPr>
+      <p:sp>
+        <p:nvSpPr>
+          <p:cNvPr id="2" name="Title 1">
+            <a:extLst>
+              <a:ext uri="{FF2B5EF4-FFF2-40B4-BE49-F238E27FC236}">
+                <a16:creationId xmlns:a16="http://schemas.microsoft.com/office/drawing/2014/main" id="{20B1ED59-C389-F09D-CFD3-07EAE0CA5B91}"/>
+              </a:ext>
+            </a:extLst>
+          </p:cNvPr>
+          <p:cNvSpPr>
+            <a:spLocks noGrp="1"/>
+          </p:cNvSpPr>
+          <p:nvPr>
+            <p:ph type="title"/>
+          </p:nvPr>
+        </p:nvSpPr>
+        <p:spPr/>
+        <p:txBody>
+          <a:bodyPr/>
+          <a:lstStyle/>
+          <a:p>
+            <a:r>
+              <a:rPr lang="en-US" dirty="0"/>
+              <a:t>User Stories and Features</a:t>
+            </a:r>
+          </a:p>
+        </p:txBody>
+      </p:sp>
+      <p:sp>
+        <p:nvSpPr>
+          <p:cNvPr id="3" name="Content Placeholder 2">
+            <a:extLst>
+              <a:ext uri="{FF2B5EF4-FFF2-40B4-BE49-F238E27FC236}">
+                <a16:creationId xmlns:a16="http://schemas.microsoft.com/office/drawing/2014/main" id="{1394487C-0CE7-CD8E-CDA1-B7A761392577}"/>
+              </a:ext>
+            </a:extLst>
+          </p:cNvPr>
+          <p:cNvSpPr>
+            <a:spLocks noGrp="1"/>
+          </p:cNvSpPr>
+          <p:nvPr>
+            <p:ph idx="1"/>
+          </p:nvPr>
+        </p:nvSpPr>
+        <p:spPr>
+          <a:xfrm>
+            <a:off x="1587710" y="1715589"/>
+            <a:ext cx="9486690" cy="4370579"/>
+          </a:xfrm>
+        </p:spPr>
+        <p:txBody>
+          <a:bodyPr>
+            <a:normAutofit/>
+          </a:bodyPr>
+          <a:lstStyle/>
+          <a:p>
+            <a:r>
+              <a:rPr lang="en-US" sz="1800" b="1" dirty="0" err="1">
+                <a:effectLst/>
+                <a:latin typeface="Times New Roman" panose="02020603050405020304" pitchFamily="18" charset="0"/>
+                <a:ea typeface="Times New Roman" panose="02020603050405020304" pitchFamily="18" charset="0"/>
+                <a:cs typeface="Times New Roman" panose="02020603050405020304" pitchFamily="18" charset="0"/>
+              </a:rPr>
+              <a:t>LogIn</a:t>
+            </a:r>
+            <a:r>
+              <a:rPr lang="en-US" sz="1800" b="1" dirty="0">
+                <a:effectLst/>
+                <a:latin typeface="Times New Roman" panose="02020603050405020304" pitchFamily="18" charset="0"/>
+                <a:ea typeface="Times New Roman" panose="02020603050405020304" pitchFamily="18" charset="0"/>
+                <a:cs typeface="Times New Roman" panose="02020603050405020304" pitchFamily="18" charset="0"/>
+              </a:rPr>
+              <a:t>/</a:t>
+            </a:r>
+            <a:r>
+              <a:rPr lang="en-US" sz="1800" b="1" dirty="0" err="1">
+                <a:effectLst/>
+                <a:latin typeface="Times New Roman" panose="02020603050405020304" pitchFamily="18" charset="0"/>
+                <a:ea typeface="Times New Roman" panose="02020603050405020304" pitchFamily="18" charset="0"/>
+                <a:cs typeface="Times New Roman" panose="02020603050405020304" pitchFamily="18" charset="0"/>
+              </a:rPr>
+              <a:t>SignUp</a:t>
+            </a:r>
+            <a:r>
+              <a:rPr lang="en-US" sz="1800" b="1" dirty="0">
+                <a:effectLst/>
+                <a:latin typeface="Times New Roman" panose="02020603050405020304" pitchFamily="18" charset="0"/>
+                <a:ea typeface="Times New Roman" panose="02020603050405020304" pitchFamily="18" charset="0"/>
+                <a:cs typeface="Times New Roman" panose="02020603050405020304" pitchFamily="18" charset="0"/>
+              </a:rPr>
+              <a:t> - As a registered user, I want to log in to my account so that I can access personalized content and participate in discussions.</a:t>
+            </a:r>
+          </a:p>
+          <a:p>
+            <a:r>
+              <a:rPr lang="en-US" sz="1800" b="1" dirty="0">
+                <a:latin typeface="Times New Roman" panose="02020603050405020304" pitchFamily="18" charset="0"/>
+                <a:ea typeface="Times New Roman" panose="02020603050405020304" pitchFamily="18" charset="0"/>
+                <a:cs typeface="Times New Roman" panose="02020603050405020304" pitchFamily="18" charset="0"/>
+              </a:rPr>
+              <a:t>Search Bar - </a:t>
+            </a:r>
+            <a:r>
+              <a:rPr lang="en-US" sz="1800" b="1" dirty="0">
+                <a:effectLst/>
+                <a:latin typeface="Times New Roman" panose="02020603050405020304" pitchFamily="18" charset="0"/>
+                <a:ea typeface="Times New Roman" panose="02020603050405020304" pitchFamily="18" charset="0"/>
+                <a:cs typeface="Times New Roman" panose="02020603050405020304" pitchFamily="18" charset="0"/>
+              </a:rPr>
+              <a:t>As a user, I want to search for software books by title, author, or topic to find relevant discussions and reviews.</a:t>
+            </a:r>
+            <a:endParaRPr lang="en-US" sz="1800" dirty="0">
+              <a:effectLst/>
+              <a:latin typeface="Calibri" panose="020F0502020204030204" pitchFamily="34" charset="0"/>
+              <a:ea typeface="Calibri" panose="020F0502020204030204" pitchFamily="34" charset="0"/>
+              <a:cs typeface="Times New Roman" panose="02020603050405020304" pitchFamily="18" charset="0"/>
+            </a:endParaRPr>
+          </a:p>
+          <a:p>
+            <a:r>
+              <a:rPr lang="en-US" sz="1800" b="1" dirty="0">
+                <a:effectLst/>
+                <a:latin typeface="Times New Roman" panose="02020603050405020304" pitchFamily="18" charset="0"/>
+                <a:ea typeface="Times New Roman" panose="02020603050405020304" pitchFamily="18" charset="0"/>
+                <a:cs typeface="Times New Roman" panose="02020603050405020304" pitchFamily="18" charset="0"/>
+              </a:rPr>
+              <a:t>Leave Review - As a member, I want to post a book review with a star rating and comments to share my thoughts on a particular software book.</a:t>
+            </a:r>
+            <a:endParaRPr lang="en-US" sz="1800" dirty="0">
+              <a:effectLst/>
+              <a:latin typeface="Calibri" panose="020F0502020204030204" pitchFamily="34" charset="0"/>
+              <a:ea typeface="Calibri" panose="020F0502020204030204" pitchFamily="34" charset="0"/>
+              <a:cs typeface="Times New Roman" panose="02020603050405020304" pitchFamily="18" charset="0"/>
+            </a:endParaRPr>
+          </a:p>
+          <a:p>
+            <a:r>
+              <a:rPr lang="en-US" sz="1800" b="1" dirty="0">
+                <a:effectLst/>
+                <a:latin typeface="Times New Roman" panose="02020603050405020304" pitchFamily="18" charset="0"/>
+                <a:ea typeface="Times New Roman" panose="02020603050405020304" pitchFamily="18" charset="0"/>
+                <a:cs typeface="Times New Roman" panose="02020603050405020304" pitchFamily="18" charset="0"/>
+              </a:rPr>
+              <a:t>Sort Books by Rating - As a user, I want to access a list of top-rated software books and see which ones are trending in the community.</a:t>
+            </a:r>
+          </a:p>
+          <a:p>
+            <a:r>
+              <a:rPr lang="en-US" sz="1800" b="1" dirty="0">
+                <a:latin typeface="Times New Roman" panose="02020603050405020304" pitchFamily="18" charset="0"/>
+                <a:ea typeface="Calibri" panose="020F0502020204030204" pitchFamily="34" charset="0"/>
+                <a:cs typeface="Times New Roman" panose="02020603050405020304" pitchFamily="18" charset="0"/>
+              </a:rPr>
+              <a:t>Sort Books by Tag – As a user, I want to find books by a specific tag and see which ones are highest rated with that specific tag. </a:t>
+            </a:r>
+            <a:endParaRPr lang="en-US" sz="1800" dirty="0">
+              <a:effectLst/>
+              <a:latin typeface="Calibri" panose="020F0502020204030204" pitchFamily="34" charset="0"/>
+              <a:ea typeface="Calibri" panose="020F0502020204030204" pitchFamily="34" charset="0"/>
+              <a:cs typeface="Times New Roman" panose="02020603050405020304" pitchFamily="18" charset="0"/>
+            </a:endParaRPr>
+          </a:p>
+          <a:p>
+            <a:pPr marL="0" indent="0">
+              <a:buNone/>
+            </a:pPr>
+            <a:endParaRPr lang="en-US" sz="1500" b="1" dirty="0">
+              <a:effectLst/>
+              <a:latin typeface="Times New Roman" panose="02020603050405020304" pitchFamily="18" charset="0"/>
+              <a:ea typeface="Times New Roman" panose="02020603050405020304" pitchFamily="18" charset="0"/>
+              <a:cs typeface="Times New Roman" panose="02020603050405020304" pitchFamily="18" charset="0"/>
+            </a:endParaRPr>
+          </a:p>
+        </p:txBody>
+      </p:sp>
+    </p:spTree>
+    <p:extLst>
+      <p:ext uri="{BB962C8B-B14F-4D97-AF65-F5344CB8AC3E}">
+        <p14:creationId xmlns:p14="http://schemas.microsoft.com/office/powerpoint/2010/main" val="4100084267"/>
+      </p:ext>
+    </p:extLst>
+  </p:cSld>
+  <p:clrMapOvr>
+    <a:masterClrMapping/>
+  </p:clrMapOvr>
+</p:sld>
+</file>
+
+<file path=ppt/slides/slide7.xml><?xml version="1.0" encoding="utf-8"?>
+<p:sld xmlns:a="http://schemas.openxmlformats.org/drawingml/2006/main" xmlns:r="http://schemas.openxmlformats.org/officeDocument/2006/relationships" xmlns:p="http://schemas.openxmlformats.org/presentationml/2006/main">
+  <p:cSld>
+    <p:spTree>
+      <p:nvGrpSpPr>
+        <p:cNvPr id="1" name=""/>
+        <p:cNvGrpSpPr/>
+        <p:nvPr/>
+      </p:nvGrpSpPr>
+      <p:grpSpPr>
+        <a:xfrm>
+          <a:off x="0" y="0"/>
+          <a:ext cx="0" cy="0"/>
+          <a:chOff x="0" y="0"/>
+          <a:chExt cx="0" cy="0"/>
+        </a:xfrm>
+      </p:grpSpPr>
+      <p:sp>
+        <p:nvSpPr>
+          <p:cNvPr id="2" name="Title 1">
+            <a:extLst>
+              <a:ext uri="{FF2B5EF4-FFF2-40B4-BE49-F238E27FC236}">
+                <a16:creationId xmlns:a16="http://schemas.microsoft.com/office/drawing/2014/main" id="{F111C44F-0FB3-C067-723D-40366BFFB164}"/>
+              </a:ext>
+            </a:extLst>
+          </p:cNvPr>
+          <p:cNvSpPr>
+            <a:spLocks noGrp="1"/>
+          </p:cNvSpPr>
+          <p:nvPr>
+            <p:ph type="title"/>
+          </p:nvPr>
+        </p:nvSpPr>
+        <p:spPr/>
+        <p:txBody>
+          <a:bodyPr/>
+          <a:lstStyle/>
+          <a:p>
+            <a:r>
+              <a:rPr lang="en-US" dirty="0"/>
+              <a:t>Web Application</a:t>
+            </a:r>
+          </a:p>
+        </p:txBody>
+      </p:sp>
+      <p:sp>
+        <p:nvSpPr>
+          <p:cNvPr id="3" name="Content Placeholder 2">
+            <a:extLst>
+              <a:ext uri="{FF2B5EF4-FFF2-40B4-BE49-F238E27FC236}">
+                <a16:creationId xmlns:a16="http://schemas.microsoft.com/office/drawing/2014/main" id="{36D10B8B-949E-3BF1-F373-4A97E84AD362}"/>
+              </a:ext>
+            </a:extLst>
+          </p:cNvPr>
+          <p:cNvSpPr>
+            <a:spLocks noGrp="1"/>
+          </p:cNvSpPr>
+          <p:nvPr>
+            <p:ph idx="1"/>
+          </p:nvPr>
+        </p:nvSpPr>
+        <p:spPr/>
+        <p:txBody>
+          <a:bodyPr/>
+          <a:lstStyle/>
+          <a:p>
+            <a:r>
+              <a:rPr lang="en-US" b="0" i="0" dirty="0">
+                <a:solidFill>
+                  <a:srgbClr val="1D1C1D"/>
+                </a:solidFill>
+                <a:effectLst/>
+                <a:latin typeface="Slack-Lato"/>
+              </a:rPr>
+              <a:t> </a:t>
+            </a:r>
+            <a:r>
+              <a:rPr lang="en-US" b="0" i="0" u="sng" dirty="0">
+                <a:effectLst/>
+                <a:latin typeface="Slack-Lato"/>
+                <a:hlinkClick r:id="rId2"/>
+              </a:rPr>
+              <a:t>https://mysoftwarebooklist.azurewebsites.net/</a:t>
+            </a:r>
+            <a:endParaRPr lang="en-US" dirty="0"/>
+          </a:p>
+        </p:txBody>
+      </p:sp>
+    </p:spTree>
+    <p:extLst>
+      <p:ext uri="{BB962C8B-B14F-4D97-AF65-F5344CB8AC3E}">
+        <p14:creationId xmlns:p14="http://schemas.microsoft.com/office/powerpoint/2010/main" val="3318864500"/>
       </p:ext>
     </p:extLst>
   </p:cSld>
@@ -7417,4 +8907,299 @@
     </a:ext>
   </a:extLst>
 </a:theme>
+</file>
+
+<file path=ppt/theme/theme2.xml><?xml version="1.0" encoding="utf-8"?>
+<a:theme xmlns:a="http://schemas.openxmlformats.org/drawingml/2006/main" name="Office Theme">
+  <a:themeElements>
+    <a:clrScheme name="Office">
+      <a:dk1>
+        <a:sysClr val="windowText" lastClr="000000"/>
+      </a:dk1>
+      <a:lt1>
+        <a:sysClr val="window" lastClr="FFFFFF"/>
+      </a:lt1>
+      <a:dk2>
+        <a:srgbClr val="44546A"/>
+      </a:dk2>
+      <a:lt2>
+        <a:srgbClr val="E7E6E6"/>
+      </a:lt2>
+      <a:accent1>
+        <a:srgbClr val="4472C4"/>
+      </a:accent1>
+      <a:accent2>
+        <a:srgbClr val="ED7D31"/>
+      </a:accent2>
+      <a:accent3>
+        <a:srgbClr val="A5A5A5"/>
+      </a:accent3>
+      <a:accent4>
+        <a:srgbClr val="FFC000"/>
+      </a:accent4>
+      <a:accent5>
+        <a:srgbClr val="5B9BD5"/>
+      </a:accent5>
+      <a:accent6>
+        <a:srgbClr val="70AD47"/>
+      </a:accent6>
+      <a:hlink>
+        <a:srgbClr val="0563C1"/>
+      </a:hlink>
+      <a:folHlink>
+        <a:srgbClr val="954F72"/>
+      </a:folHlink>
+    </a:clrScheme>
+    <a:fontScheme name="Office">
+      <a:majorFont>
+        <a:latin typeface="Calibri Light" panose="020F0302020204030204"/>
+        <a:ea typeface=""/>
+        <a:cs typeface=""/>
+        <a:font script="Jpan" typeface="游ゴシック Light"/>
+        <a:font script="Hang" typeface="맑은 고딕"/>
+        <a:font script="Hans" typeface="等线 Light"/>
+        <a:font script="Hant" typeface="新細明體"/>
+        <a:font script="Arab" typeface="Times New Roman"/>
+        <a:font script="Hebr" typeface="Times New Roman"/>
+        <a:font script="Thai" typeface="Angsana New"/>
+        <a:font script="Ethi" typeface="Nyala"/>
+        <a:font script="Beng" typeface="Vrinda"/>
+        <a:font script="Gujr" typeface="Shruti"/>
+        <a:font script="Khmr" typeface="MoolBoran"/>
+        <a:font script="Knda" typeface="Tunga"/>
+        <a:font script="Guru" typeface="Raavi"/>
+        <a:font script="Cans" typeface="Euphemia"/>
+        <a:font script="Cher" typeface="Plantagenet Cherokee"/>
+        <a:font script="Yiii" typeface="Microsoft Yi Baiti"/>
+        <a:font script="Tibt" typeface="Microsoft Himalaya"/>
+        <a:font script="Thaa" typeface="MV Boli"/>
+        <a:font script="Deva" typeface="Mangal"/>
+        <a:font script="Telu" typeface="Gautami"/>
+        <a:font script="Taml" typeface="Latha"/>
+        <a:font script="Syrc" typeface="Estrangelo Edessa"/>
+        <a:font script="Orya" typeface="Kalinga"/>
+        <a:font script="Mlym" typeface="Kartika"/>
+        <a:font script="Laoo" typeface="DokChampa"/>
+        <a:font script="Sinh" typeface="Iskoola Pota"/>
+        <a:font script="Mong" typeface="Mongolian Baiti"/>
+        <a:font script="Viet" typeface="Times New Roman"/>
+        <a:font script="Uigh" typeface="Microsoft Uighur"/>
+        <a:font script="Geor" typeface="Sylfaen"/>
+        <a:font script="Armn" typeface="Arial"/>
+        <a:font script="Bugi" typeface="Leelawadee UI"/>
+        <a:font script="Bopo" typeface="Microsoft JhengHei"/>
+        <a:font script="Java" typeface="Javanese Text"/>
+        <a:font script="Lisu" typeface="Segoe UI"/>
+        <a:font script="Mymr" typeface="Myanmar Text"/>
+        <a:font script="Nkoo" typeface="Ebrima"/>
+        <a:font script="Olck" typeface="Nirmala UI"/>
+        <a:font script="Osma" typeface="Ebrima"/>
+        <a:font script="Phag" typeface="Phagspa"/>
+        <a:font script="Syrn" typeface="Estrangelo Edessa"/>
+        <a:font script="Syrj" typeface="Estrangelo Edessa"/>
+        <a:font script="Syre" typeface="Estrangelo Edessa"/>
+        <a:font script="Sora" typeface="Nirmala UI"/>
+        <a:font script="Tale" typeface="Microsoft Tai Le"/>
+        <a:font script="Talu" typeface="Microsoft New Tai Lue"/>
+        <a:font script="Tfng" typeface="Ebrima"/>
+      </a:majorFont>
+      <a:minorFont>
+        <a:latin typeface="Calibri" panose="020F0502020204030204"/>
+        <a:ea typeface=""/>
+        <a:cs typeface=""/>
+        <a:font script="Jpan" typeface="游ゴシック"/>
+        <a:font script="Hang" typeface="맑은 고딕"/>
+        <a:font script="Hans" typeface="等线"/>
+        <a:font script="Hant" typeface="新細明體"/>
+        <a:font script="Arab" typeface="Arial"/>
+        <a:font script="Hebr" typeface="Arial"/>
+        <a:font script="Thai" typeface="Cordia New"/>
+        <a:font script="Ethi" typeface="Nyala"/>
+        <a:font script="Beng" typeface="Vrinda"/>
+        <a:font script="Gujr" typeface="Shruti"/>
+        <a:font script="Khmr" typeface="DaunPenh"/>
+        <a:font script="Knda" typeface="Tunga"/>
+        <a:font script="Guru" typeface="Raavi"/>
+        <a:font script="Cans" typeface="Euphemia"/>
+        <a:font script="Cher" typeface="Plantagenet Cherokee"/>
+        <a:font script="Yiii" typeface="Microsoft Yi Baiti"/>
+        <a:font script="Tibt" typeface="Microsoft Himalaya"/>
+        <a:font script="Thaa" typeface="MV Boli"/>
+        <a:font script="Deva" typeface="Mangal"/>
+        <a:font script="Telu" typeface="Gautami"/>
+        <a:font script="Taml" typeface="Latha"/>
+        <a:font script="Syrc" typeface="Estrangelo Edessa"/>
+        <a:font script="Orya" typeface="Kalinga"/>
+        <a:font script="Mlym" typeface="Kartika"/>
+        <a:font script="Laoo" typeface="DokChampa"/>
+        <a:font script="Sinh" typeface="Iskoola Pota"/>
+        <a:font script="Mong" typeface="Mongolian Baiti"/>
+        <a:font script="Viet" typeface="Arial"/>
+        <a:font script="Uigh" typeface="Microsoft Uighur"/>
+        <a:font script="Geor" typeface="Sylfaen"/>
+        <a:font script="Armn" typeface="Arial"/>
+        <a:font script="Bugi" typeface="Leelawadee UI"/>
+        <a:font script="Bopo" typeface="Microsoft JhengHei"/>
+        <a:font script="Java" typeface="Javanese Text"/>
+        <a:font script="Lisu" typeface="Segoe UI"/>
+        <a:font script="Mymr" typeface="Myanmar Text"/>
+        <a:font script="Nkoo" typeface="Ebrima"/>
+        <a:font script="Olck" typeface="Nirmala UI"/>
+        <a:font script="Osma" typeface="Ebrima"/>
+        <a:font script="Phag" typeface="Phagspa"/>
+        <a:font script="Syrn" typeface="Estrangelo Edessa"/>
+        <a:font script="Syrj" typeface="Estrangelo Edessa"/>
+        <a:font script="Syre" typeface="Estrangelo Edessa"/>
+        <a:font script="Sora" typeface="Nirmala UI"/>
+        <a:font script="Tale" typeface="Microsoft Tai Le"/>
+        <a:font script="Talu" typeface="Microsoft New Tai Lue"/>
+        <a:font script="Tfng" typeface="Ebrima"/>
+      </a:minorFont>
+    </a:fontScheme>
+    <a:fmtScheme name="Office">
+      <a:fillStyleLst>
+        <a:solidFill>
+          <a:schemeClr val="phClr"/>
+        </a:solidFill>
+        <a:gradFill rotWithShape="1">
+          <a:gsLst>
+            <a:gs pos="0">
+              <a:schemeClr val="phClr">
+                <a:lumMod val="110000"/>
+                <a:satMod val="105000"/>
+                <a:tint val="67000"/>
+              </a:schemeClr>
+            </a:gs>
+            <a:gs pos="50000">
+              <a:schemeClr val="phClr">
+                <a:lumMod val="105000"/>
+                <a:satMod val="103000"/>
+                <a:tint val="73000"/>
+              </a:schemeClr>
+            </a:gs>
+            <a:gs pos="100000">
+              <a:schemeClr val="phClr">
+                <a:lumMod val="105000"/>
+                <a:satMod val="109000"/>
+                <a:tint val="81000"/>
+              </a:schemeClr>
+            </a:gs>
+          </a:gsLst>
+          <a:lin ang="5400000" scaled="0"/>
+        </a:gradFill>
+        <a:gradFill rotWithShape="1">
+          <a:gsLst>
+            <a:gs pos="0">
+              <a:schemeClr val="phClr">
+                <a:satMod val="103000"/>
+                <a:lumMod val="102000"/>
+                <a:tint val="94000"/>
+              </a:schemeClr>
+            </a:gs>
+            <a:gs pos="50000">
+              <a:schemeClr val="phClr">
+                <a:satMod val="110000"/>
+                <a:lumMod val="100000"/>
+                <a:shade val="100000"/>
+              </a:schemeClr>
+            </a:gs>
+            <a:gs pos="100000">
+              <a:schemeClr val="phClr">
+                <a:lumMod val="99000"/>
+                <a:satMod val="120000"/>
+                <a:shade val="78000"/>
+              </a:schemeClr>
+            </a:gs>
+          </a:gsLst>
+          <a:lin ang="5400000" scaled="0"/>
+        </a:gradFill>
+      </a:fillStyleLst>
+      <a:lnStyleLst>
+        <a:ln w="6350" cap="flat" cmpd="sng" algn="ctr">
+          <a:solidFill>
+            <a:schemeClr val="phClr"/>
+          </a:solidFill>
+          <a:prstDash val="solid"/>
+          <a:miter lim="800000"/>
+        </a:ln>
+        <a:ln w="12700" cap="flat" cmpd="sng" algn="ctr">
+          <a:solidFill>
+            <a:schemeClr val="phClr"/>
+          </a:solidFill>
+          <a:prstDash val="solid"/>
+          <a:miter lim="800000"/>
+        </a:ln>
+        <a:ln w="19050" cap="flat" cmpd="sng" algn="ctr">
+          <a:solidFill>
+            <a:schemeClr val="phClr"/>
+          </a:solidFill>
+          <a:prstDash val="solid"/>
+          <a:miter lim="800000"/>
+        </a:ln>
+      </a:lnStyleLst>
+      <a:effectStyleLst>
+        <a:effectStyle>
+          <a:effectLst/>
+        </a:effectStyle>
+        <a:effectStyle>
+          <a:effectLst/>
+        </a:effectStyle>
+        <a:effectStyle>
+          <a:effectLst>
+            <a:outerShdw blurRad="57150" dist="19050" dir="5400000" algn="ctr" rotWithShape="0">
+              <a:srgbClr val="000000">
+                <a:alpha val="63000"/>
+              </a:srgbClr>
+            </a:outerShdw>
+          </a:effectLst>
+        </a:effectStyle>
+      </a:effectStyleLst>
+      <a:bgFillStyleLst>
+        <a:solidFill>
+          <a:schemeClr val="phClr"/>
+        </a:solidFill>
+        <a:solidFill>
+          <a:schemeClr val="phClr">
+            <a:tint val="95000"/>
+            <a:satMod val="170000"/>
+          </a:schemeClr>
+        </a:solidFill>
+        <a:gradFill rotWithShape="1">
+          <a:gsLst>
+            <a:gs pos="0">
+              <a:schemeClr val="phClr">
+                <a:tint val="93000"/>
+                <a:satMod val="150000"/>
+                <a:shade val="98000"/>
+                <a:lumMod val="102000"/>
+              </a:schemeClr>
+            </a:gs>
+            <a:gs pos="50000">
+              <a:schemeClr val="phClr">
+                <a:tint val="98000"/>
+                <a:satMod val="130000"/>
+                <a:shade val="90000"/>
+                <a:lumMod val="103000"/>
+              </a:schemeClr>
+            </a:gs>
+            <a:gs pos="100000">
+              <a:schemeClr val="phClr">
+                <a:shade val="63000"/>
+                <a:satMod val="120000"/>
+              </a:schemeClr>
+            </a:gs>
+          </a:gsLst>
+          <a:lin ang="5400000" scaled="0"/>
+        </a:gradFill>
+      </a:bgFillStyleLst>
+    </a:fmtScheme>
+  </a:themeElements>
+  <a:objectDefaults/>
+  <a:extraClrSchemeLst/>
+  <a:extLst>
+    <a:ext uri="{05A4C25C-085E-4340-85A3-A5531E510DB2}">
+      <thm15:themeFamily xmlns:thm15="http://schemas.microsoft.com/office/thememl/2012/main" name="Office Theme" id="{62F939B6-93AF-4DB8-9C6B-D6C7DFDC589F}" vid="{4A3C46E8-61CC-4603-A589-7422A47A8E4A}"/>
+    </a:ext>
+  </a:extLst>
+</a:theme>
 </file>
</xml_diff>